<commit_message>
Änderung der Dokumente Rename auf "Heisl-Finder" Navigation auf Fußgängermodus geändert
</commit_message>
<xml_diff>
--- a/Shitdroid/assets/WC-Finder.pptx
+++ b/Shitdroid/assets/WC-Finder.pptx
@@ -5,7 +5,7 @@
     <p:sldMasterId id="2147483648" r:id="rId1"/>
   </p:sldMasterIdLst>
   <p:notesMasterIdLst>
-    <p:notesMasterId r:id="rId14"/>
+    <p:notesMasterId r:id="rId13"/>
   </p:notesMasterIdLst>
   <p:sldIdLst>
     <p:sldId id="256" r:id="rId2"/>
@@ -16,10 +16,9 @@
     <p:sldId id="272" r:id="rId7"/>
     <p:sldId id="273" r:id="rId8"/>
     <p:sldId id="266" r:id="rId9"/>
-    <p:sldId id="265" r:id="rId10"/>
-    <p:sldId id="267" r:id="rId11"/>
-    <p:sldId id="268" r:id="rId12"/>
-    <p:sldId id="270" r:id="rId13"/>
+    <p:sldId id="267" r:id="rId10"/>
+    <p:sldId id="268" r:id="rId11"/>
+    <p:sldId id="270" r:id="rId12"/>
   </p:sldIdLst>
   <p:sldSz cx="9144000" cy="6858000" type="screen4x3"/>
   <p:notesSz cx="6858000" cy="9144000"/>
@@ -322,7 +321,7 @@
         <p:nvSpPr>
           <p:cNvPr id="9220" name="Rectangle 4"/>
           <p:cNvSpPr>
-            <a:spLocks noRot="1" noChangeArrowheads="1" noTextEdit="1"/>
+            <a:spLocks noGrp="1" noRot="1" noChangeAspect="1" noChangeArrowheads="1" noTextEdit="1"/>
           </p:cNvSpPr>
           <p:nvPr>
             <p:ph type="sldImg" idx="2"/>
@@ -2610,8 +2609,12 @@
           <a:p>
             <a:pPr eaLnBrk="1" hangingPunct="1"/>
             <a:r>
+              <a:rPr lang="de-DE" dirty="0" err="1" smtClean="0"/>
+              <a:t>Heisl</a:t>
+            </a:r>
+            <a:r>
               <a:rPr lang="de-DE" dirty="0" smtClean="0"/>
-              <a:t>WC-Finder</a:t>
+              <a:t>-Finder</a:t>
             </a:r>
             <a:endParaRPr lang="de-DE" dirty="0" smtClean="0"/>
           </a:p>
@@ -2649,7 +2652,6 @@
               <a:rPr lang="de-DE" dirty="0" smtClean="0"/>
               <a:t>Christian SCHROLLENBERGER</a:t>
             </a:r>
-            <a:endParaRPr lang="de-DE" dirty="0" smtClean="0"/>
           </a:p>
         </p:txBody>
       </p:sp>
@@ -2749,7 +2751,7 @@
             <a:pPr algn="ctr"/>
             <a:r>
               <a:rPr lang="de-AT" dirty="0" smtClean="0"/>
-              <a:t>Anzeige - Karte</a:t>
+              <a:t>Anzeige - Kurzinfo</a:t>
             </a:r>
             <a:endParaRPr lang="de-AT" dirty="0"/>
           </a:p>
@@ -2850,13 +2852,13 @@
       </p:sp>
       <p:pic>
         <p:nvPicPr>
-          <p:cNvPr id="17410" name="Picture 2"/>
+          <p:cNvPr id="1027" name="Picture 3"/>
           <p:cNvPicPr>
             <a:picLocks noChangeAspect="1" noChangeArrowheads="1"/>
           </p:cNvPicPr>
           <p:nvPr/>
         </p:nvPicPr>
-        <p:blipFill rotWithShape="1">
+        <p:blipFill>
           <a:blip r:embed="rId2">
             <a:extLst>
               <a:ext uri="{28A0092B-C50C-407E-A947-70E740481C1C}">
@@ -2864,224 +2866,15 @@
               </a:ext>
             </a:extLst>
           </a:blip>
-          <a:srcRect t="4401"/>
-          <a:stretch/>
+          <a:srcRect/>
+          <a:stretch>
+            <a:fillRect/>
+          </a:stretch>
         </p:blipFill>
         <p:spPr bwMode="auto">
           <a:xfrm>
-            <a:off x="2915816" y="1064870"/>
-            <a:ext cx="3312368" cy="5277653"/>
-          </a:xfrm>
-          <a:prstGeom prst="rect">
-            <a:avLst/>
-          </a:prstGeom>
-          <a:noFill/>
-          <a:ln>
-            <a:noFill/>
-          </a:ln>
-          <a:extLst>
-            <a:ext uri="{909E8E84-426E-40DD-AFC4-6F175D3DCCD1}">
-              <a14:hiddenFill xmlns:a14="http://schemas.microsoft.com/office/drawing/2010/main">
-                <a:solidFill>
-                  <a:schemeClr val="accent1"/>
-                </a:solidFill>
-              </a14:hiddenFill>
-            </a:ext>
-            <a:ext uri="{91240B29-F687-4F45-9708-019B960494DF}">
-              <a14:hiddenLine xmlns:a14="http://schemas.microsoft.com/office/drawing/2010/main" w="9525">
-                <a:solidFill>
-                  <a:schemeClr val="tx1"/>
-                </a:solidFill>
-                <a:miter lim="800000"/>
-                <a:headEnd/>
-                <a:tailEnd/>
-              </a14:hiddenLine>
-            </a:ext>
-          </a:extLst>
-        </p:spPr>
-      </p:pic>
-    </p:spTree>
-    <p:extLst>
-      <p:ext uri="{BB962C8B-B14F-4D97-AF65-F5344CB8AC3E}">
-        <p14:creationId xmlns:p14="http://schemas.microsoft.com/office/powerpoint/2010/main" val="2101105479"/>
-      </p:ext>
-    </p:extLst>
-  </p:cSld>
-  <p:clrMapOvr>
-    <a:masterClrMapping/>
-  </p:clrMapOvr>
-  <p:timing>
-    <p:tnLst>
-      <p:par>
-        <p:cTn id="1" dur="indefinite" restart="never" nodeType="tmRoot"/>
-      </p:par>
-    </p:tnLst>
-  </p:timing>
-</p:sld>
-</file>
-
-<file path=ppt/slides/slide11.xml><?xml version="1.0" encoding="utf-8"?>
-<p:sld xmlns:a="http://schemas.openxmlformats.org/drawingml/2006/main" xmlns:r="http://schemas.openxmlformats.org/officeDocument/2006/relationships" xmlns:p="http://schemas.openxmlformats.org/presentationml/2006/main">
-  <p:cSld>
-    <p:spTree>
-      <p:nvGrpSpPr>
-        <p:cNvPr id="1" name=""/>
-        <p:cNvGrpSpPr/>
-        <p:nvPr/>
-      </p:nvGrpSpPr>
-      <p:grpSpPr>
-        <a:xfrm>
-          <a:off x="0" y="0"/>
-          <a:ext cx="0" cy="0"/>
-          <a:chOff x="0" y="0"/>
-          <a:chExt cx="0" cy="0"/>
-        </a:xfrm>
-      </p:grpSpPr>
-      <p:sp>
-        <p:nvSpPr>
-          <p:cNvPr id="2" name="Titel 1"/>
-          <p:cNvSpPr>
-            <a:spLocks noGrp="1"/>
-          </p:cNvSpPr>
-          <p:nvPr>
-            <p:ph type="title"/>
-          </p:nvPr>
-        </p:nvSpPr>
-        <p:spPr>
-          <a:xfrm>
-            <a:off x="611188" y="188640"/>
-            <a:ext cx="7848600" cy="622300"/>
-          </a:xfrm>
-        </p:spPr>
-        <p:txBody>
-          <a:bodyPr/>
-          <a:lstStyle/>
-          <a:p>
-            <a:pPr algn="ctr"/>
-            <a:r>
-              <a:rPr lang="de-AT" dirty="0" smtClean="0"/>
-              <a:t>Anzeige - Kurzinfo</a:t>
-            </a:r>
-            <a:endParaRPr lang="de-AT" dirty="0"/>
-          </a:p>
-        </p:txBody>
-      </p:sp>
-      <p:sp>
-        <p:nvSpPr>
-          <p:cNvPr id="3" name="Inhaltsplatzhalter 2"/>
-          <p:cNvSpPr>
-            <a:spLocks noGrp="1"/>
-          </p:cNvSpPr>
-          <p:nvPr>
-            <p:ph idx="1"/>
-          </p:nvPr>
-        </p:nvSpPr>
-        <p:spPr/>
-        <p:txBody>
-          <a:bodyPr/>
-          <a:lstStyle/>
-          <a:p>
-            <a:pPr marL="0" indent="0">
-              <a:buNone/>
-            </a:pPr>
-            <a:endParaRPr lang="de-AT" dirty="0"/>
-          </a:p>
-        </p:txBody>
-      </p:sp>
-      <p:sp>
-        <p:nvSpPr>
-          <p:cNvPr id="4" name="Foliennummernplatzhalter 3"/>
-          <p:cNvSpPr>
-            <a:spLocks noGrp="1"/>
-          </p:cNvSpPr>
-          <p:nvPr>
-            <p:ph type="sldNum" sz="quarter" idx="10"/>
-          </p:nvPr>
-        </p:nvSpPr>
-        <p:spPr/>
-        <p:txBody>
-          <a:bodyPr/>
-          <a:lstStyle/>
-          <a:p>
-            <a:pPr>
-              <a:defRPr/>
-            </a:pPr>
-            <a:endParaRPr lang="de-AT" sz="1000" smtClean="0">
-              <a:solidFill>
-                <a:schemeClr val="tx1"/>
-              </a:solidFill>
-            </a:endParaRPr>
-          </a:p>
-          <a:p>
-            <a:pPr>
-              <a:defRPr/>
-            </a:pPr>
-            <a:fld id="{34C7A390-40CF-4EA4-9428-BEF2AE9E52D9}" type="slidenum">
-              <a:rPr lang="de-AT" smtClean="0"/>
-              <a:pPr>
-                <a:defRPr/>
-              </a:pPr>
-              <a:t>11</a:t>
-            </a:fld>
-            <a:endParaRPr lang="de-AT"/>
-          </a:p>
-        </p:txBody>
-      </p:sp>
-      <p:sp>
-        <p:nvSpPr>
-          <p:cNvPr id="5" name="Fußzeilenplatzhalter 4"/>
-          <p:cNvSpPr>
-            <a:spLocks noGrp="1"/>
-          </p:cNvSpPr>
-          <p:nvPr>
-            <p:ph type="ftr" sz="quarter" idx="11"/>
-          </p:nvPr>
-        </p:nvSpPr>
-        <p:spPr/>
-        <p:txBody>
-          <a:bodyPr/>
-          <a:lstStyle/>
-          <a:p>
-            <a:pPr>
-              <a:defRPr/>
-            </a:pPr>
-            <a:endParaRPr lang="de-AT" smtClean="0"/>
-          </a:p>
-          <a:p>
-            <a:pPr>
-              <a:defRPr/>
-            </a:pPr>
-            <a:r>
-              <a:rPr lang="de-AT" smtClean="0"/>
-              <a:t>© 2012/13 FH Technikum Wien</a:t>
-            </a:r>
-            <a:endParaRPr lang="de-AT"/>
-          </a:p>
-        </p:txBody>
-      </p:sp>
-      <p:pic>
-        <p:nvPicPr>
-          <p:cNvPr id="18434" name="Picture 2"/>
-          <p:cNvPicPr>
-            <a:picLocks noChangeAspect="1" noChangeArrowheads="1"/>
-          </p:cNvPicPr>
-          <p:nvPr/>
-        </p:nvPicPr>
-        <p:blipFill rotWithShape="1">
-          <a:blip r:embed="rId2">
-            <a:extLst>
-              <a:ext uri="{28A0092B-C50C-407E-A947-70E740481C1C}">
-                <a14:useLocalDpi xmlns:a14="http://schemas.microsoft.com/office/drawing/2010/main" val="0"/>
-              </a:ext>
-            </a:extLst>
-          </a:blip>
-          <a:srcRect t="4682"/>
-          <a:stretch/>
-        </p:blipFill>
-        <p:spPr bwMode="auto">
-          <a:xfrm>
-            <a:off x="2915816" y="1006997"/>
-            <a:ext cx="3384376" cy="5376522"/>
+            <a:off x="3357563" y="2492896"/>
+            <a:ext cx="2428875" cy="1171575"/>
           </a:xfrm>
           <a:prstGeom prst="rect">
             <a:avLst/>
@@ -3131,7 +2924,7 @@
 </p:sld>
 </file>
 
-<file path=ppt/slides/slide12.xml><?xml version="1.0" encoding="utf-8"?>
+<file path=ppt/slides/slide11.xml><?xml version="1.0" encoding="utf-8"?>
 <p:sld xmlns:a="http://schemas.openxmlformats.org/drawingml/2006/main" xmlns:r="http://schemas.openxmlformats.org/officeDocument/2006/relationships" xmlns:p="http://schemas.openxmlformats.org/presentationml/2006/main">
   <p:cSld>
     <p:spTree>
@@ -3232,7 +3025,7 @@
               <a:pPr>
                 <a:defRPr/>
               </a:pPr>
-              <a:t>12</a:t>
+              <a:t>11</a:t>
             </a:fld>
             <a:endParaRPr lang="de-AT"/>
           </a:p>
@@ -3272,7 +3065,7 @@
       </p:sp>
       <p:pic>
         <p:nvPicPr>
-          <p:cNvPr id="19458" name="Picture 2"/>
+          <p:cNvPr id="2050" name="Picture 2"/>
           <p:cNvPicPr>
             <a:picLocks noChangeAspect="1" noChangeArrowheads="1"/>
           </p:cNvPicPr>
@@ -3286,13 +3079,13 @@
               </a:ext>
             </a:extLst>
           </a:blip>
-          <a:srcRect t="4451"/>
+          <a:srcRect t="5505"/>
           <a:stretch/>
         </p:blipFill>
         <p:spPr bwMode="auto">
           <a:xfrm>
-            <a:off x="2915816" y="1157468"/>
-            <a:ext cx="3353544" cy="5340492"/>
+            <a:off x="2699792" y="836712"/>
+            <a:ext cx="3672408" cy="5783727"/>
           </a:xfrm>
           <a:prstGeom prst="rect">
             <a:avLst/>
@@ -3833,8 +3626,13 @@
           <a:p>
             <a:r>
               <a:rPr lang="de-AT" dirty="0" smtClean="0"/>
-              <a:t>Navigation zur gewünschten WC-Anlage</a:t>
-            </a:r>
+              <a:t>Navigation zur gewünschten </a:t>
+            </a:r>
+            <a:r>
+              <a:rPr lang="de-AT" dirty="0" smtClean="0"/>
+              <a:t>WC-Anlage (Fußgängernavigation)</a:t>
+            </a:r>
+            <a:endParaRPr lang="de-AT" dirty="0" smtClean="0"/>
           </a:p>
           <a:p>
             <a:endParaRPr lang="de-AT" dirty="0"/>
@@ -5113,7 +4911,7 @@
             <a:pPr algn="ctr"/>
             <a:r>
               <a:rPr lang="de-AT" dirty="0" smtClean="0"/>
-              <a:t>Einstieg</a:t>
+              <a:t>Anzeige - Karte</a:t>
             </a:r>
             <a:endParaRPr lang="de-AT" dirty="0"/>
           </a:p>
@@ -5214,7 +5012,7 @@
       </p:sp>
       <p:pic>
         <p:nvPicPr>
-          <p:cNvPr id="16387" name="Picture 3"/>
+          <p:cNvPr id="7" name="Picture 2"/>
           <p:cNvPicPr>
             <a:picLocks noChangeAspect="1" noChangeArrowheads="1"/>
           </p:cNvPicPr>
@@ -5228,13 +5026,13 @@
               </a:ext>
             </a:extLst>
           </a:blip>
-          <a:srcRect t="4312"/>
+          <a:srcRect t="4938"/>
           <a:stretch/>
         </p:blipFill>
         <p:spPr bwMode="auto">
           <a:xfrm>
-            <a:off x="3059832" y="1122743"/>
-            <a:ext cx="3312368" cy="5282585"/>
+            <a:off x="2771690" y="810451"/>
+            <a:ext cx="3600400" cy="5704394"/>
           </a:xfrm>
           <a:prstGeom prst="rect">
             <a:avLst/>
@@ -5267,7 +5065,7 @@
     </p:spTree>
     <p:extLst>
       <p:ext uri="{BB962C8B-B14F-4D97-AF65-F5344CB8AC3E}">
-        <p14:creationId xmlns:p14="http://schemas.microsoft.com/office/powerpoint/2010/main" val="462490051"/>
+        <p14:creationId xmlns:p14="http://schemas.microsoft.com/office/powerpoint/2010/main" val="2101105479"/>
       </p:ext>
     </p:extLst>
   </p:cSld>

</xml_diff>